<commit_message>
reduced number of slides
</commit_message>
<xml_diff>
--- a/Database_Slides.pptx
+++ b/Database_Slides.pptx
@@ -5,13 +5,11 @@
     <p:sldMasterId id="2147483648" r:id="rId1"/>
   </p:sldMasterIdLst>
   <p:sldIdLst>
-    <p:sldId id="257" r:id="rId2"/>
-    <p:sldId id="262" r:id="rId3"/>
-    <p:sldId id="264" r:id="rId4"/>
-    <p:sldId id="263" r:id="rId5"/>
-    <p:sldId id="259" r:id="rId6"/>
-    <p:sldId id="260" r:id="rId7"/>
-    <p:sldId id="261" r:id="rId8"/>
+    <p:sldId id="265" r:id="rId2"/>
+    <p:sldId id="263" r:id="rId3"/>
+    <p:sldId id="259" r:id="rId4"/>
+    <p:sldId id="260" r:id="rId5"/>
+    <p:sldId id="261" r:id="rId6"/>
   </p:sldIdLst>
   <p:sldSz cx="12192000" cy="6858000"/>
   <p:notesSz cx="6858000" cy="9144000"/>
@@ -110,6 +108,11 @@
       </a:defRPr>
     </a:lvl9pPr>
   </p:defaultTextStyle>
+  <p:extLst>
+    <p:ext uri="{EFAFB233-063F-42B5-8137-9DF3F51BA10A}">
+      <p15:sldGuideLst xmlns:p15="http://schemas.microsoft.com/office/powerpoint/2012/main"/>
+    </p:ext>
+  </p:extLst>
 </p:presentation>
 </file>
 
@@ -7738,7 +7741,7 @@
           <a:p>
             <a:fld id="{4AF0CF05-E4CD-4545-8219-A5F0165014BB}" type="datetimeFigureOut">
               <a:rPr lang="en-US" smtClean="0"/>
-              <a:t>4/19/2022</a:t>
+              <a:t>4/22/2022</a:t>
             </a:fld>
             <a:endParaRPr lang="en-US"/>
           </a:p>
@@ -7936,7 +7939,7 @@
           <a:p>
             <a:fld id="{4AF0CF05-E4CD-4545-8219-A5F0165014BB}" type="datetimeFigureOut">
               <a:rPr lang="en-US" smtClean="0"/>
-              <a:t>4/19/2022</a:t>
+              <a:t>4/22/2022</a:t>
             </a:fld>
             <a:endParaRPr lang="en-US"/>
           </a:p>
@@ -8144,7 +8147,7 @@
           <a:p>
             <a:fld id="{4AF0CF05-E4CD-4545-8219-A5F0165014BB}" type="datetimeFigureOut">
               <a:rPr lang="en-US" smtClean="0"/>
-              <a:t>4/19/2022</a:t>
+              <a:t>4/22/2022</a:t>
             </a:fld>
             <a:endParaRPr lang="en-US"/>
           </a:p>
@@ -8342,7 +8345,7 @@
           <a:p>
             <a:fld id="{4AF0CF05-E4CD-4545-8219-A5F0165014BB}" type="datetimeFigureOut">
               <a:rPr lang="en-US" smtClean="0"/>
-              <a:t>4/19/2022</a:t>
+              <a:t>4/22/2022</a:t>
             </a:fld>
             <a:endParaRPr lang="en-US"/>
           </a:p>
@@ -8617,7 +8620,7 @@
           <a:p>
             <a:fld id="{4AF0CF05-E4CD-4545-8219-A5F0165014BB}" type="datetimeFigureOut">
               <a:rPr lang="en-US" smtClean="0"/>
-              <a:t>4/19/2022</a:t>
+              <a:t>4/22/2022</a:t>
             </a:fld>
             <a:endParaRPr lang="en-US"/>
           </a:p>
@@ -8882,7 +8885,7 @@
           <a:p>
             <a:fld id="{4AF0CF05-E4CD-4545-8219-A5F0165014BB}" type="datetimeFigureOut">
               <a:rPr lang="en-US" smtClean="0"/>
-              <a:t>4/19/2022</a:t>
+              <a:t>4/22/2022</a:t>
             </a:fld>
             <a:endParaRPr lang="en-US"/>
           </a:p>
@@ -9294,7 +9297,7 @@
           <a:p>
             <a:fld id="{4AF0CF05-E4CD-4545-8219-A5F0165014BB}" type="datetimeFigureOut">
               <a:rPr lang="en-US" smtClean="0"/>
-              <a:t>4/19/2022</a:t>
+              <a:t>4/22/2022</a:t>
             </a:fld>
             <a:endParaRPr lang="en-US"/>
           </a:p>
@@ -9435,7 +9438,7 @@
           <a:p>
             <a:fld id="{4AF0CF05-E4CD-4545-8219-A5F0165014BB}" type="datetimeFigureOut">
               <a:rPr lang="en-US" smtClean="0"/>
-              <a:t>4/19/2022</a:t>
+              <a:t>4/22/2022</a:t>
             </a:fld>
             <a:endParaRPr lang="en-US"/>
           </a:p>
@@ -9548,7 +9551,7 @@
           <a:p>
             <a:fld id="{4AF0CF05-E4CD-4545-8219-A5F0165014BB}" type="datetimeFigureOut">
               <a:rPr lang="en-US" smtClean="0"/>
-              <a:t>4/19/2022</a:t>
+              <a:t>4/22/2022</a:t>
             </a:fld>
             <a:endParaRPr lang="en-US"/>
           </a:p>
@@ -9859,7 +9862,7 @@
           <a:p>
             <a:fld id="{4AF0CF05-E4CD-4545-8219-A5F0165014BB}" type="datetimeFigureOut">
               <a:rPr lang="en-US" smtClean="0"/>
-              <a:t>4/19/2022</a:t>
+              <a:t>4/22/2022</a:t>
             </a:fld>
             <a:endParaRPr lang="en-US"/>
           </a:p>
@@ -10147,7 +10150,7 @@
           <a:p>
             <a:fld id="{4AF0CF05-E4CD-4545-8219-A5F0165014BB}" type="datetimeFigureOut">
               <a:rPr lang="en-US" smtClean="0"/>
-              <a:t>4/19/2022</a:t>
+              <a:t>4/22/2022</a:t>
             </a:fld>
             <a:endParaRPr lang="en-US"/>
           </a:p>
@@ -10388,7 +10391,7 @@
           <a:p>
             <a:fld id="{4AF0CF05-E4CD-4545-8219-A5F0165014BB}" type="datetimeFigureOut">
               <a:rPr lang="en-US" smtClean="0"/>
-              <a:t>4/19/2022</a:t>
+              <a:t>4/22/2022</a:t>
             </a:fld>
             <a:endParaRPr lang="en-US"/>
           </a:p>
@@ -10810,7 +10813,7 @@
           <p:cNvPr id="2" name="Title 1">
             <a:extLst>
               <a:ext uri="{FF2B5EF4-FFF2-40B4-BE49-F238E27FC236}">
-                <a16:creationId xmlns:a16="http://schemas.microsoft.com/office/drawing/2014/main" id="{A4EC0B9E-BFE0-48D8-B5A2-1B71C8319C92}"/>
+                <a16:creationId xmlns:a16="http://schemas.microsoft.com/office/drawing/2014/main" id="{3487D321-CB75-4B5A-8060-75360597EC04}"/>
               </a:ext>
             </a:extLst>
           </p:cNvPr>
@@ -10828,7 +10831,7 @@
           <a:p>
             <a:r>
               <a:rPr lang="en-US" dirty="0"/>
-              <a:t>Airbnb Data</a:t>
+              <a:t>Data Sets and Database</a:t>
             </a:r>
           </a:p>
         </p:txBody>
@@ -10838,7 +10841,7 @@
           <p:cNvPr id="3" name="Content Placeholder 2">
             <a:extLst>
               <a:ext uri="{FF2B5EF4-FFF2-40B4-BE49-F238E27FC236}">
-                <a16:creationId xmlns:a16="http://schemas.microsoft.com/office/drawing/2014/main" id="{854682A1-CCB3-4D78-BF27-C625AE50EBB2}"/>
+                <a16:creationId xmlns:a16="http://schemas.microsoft.com/office/drawing/2014/main" id="{DB3FB10F-BB8F-4E8A-8E4D-4DBECD449D10}"/>
               </a:ext>
             </a:extLst>
           </p:cNvPr>
@@ -10851,9 +10854,18 @@
         </p:nvSpPr>
         <p:spPr/>
         <p:txBody>
-          <a:bodyPr/>
+          <a:bodyPr>
+            <a:normAutofit fontScale="92500" lnSpcReduction="20000"/>
+          </a:bodyPr>
           <a:lstStyle/>
           <a:p>
+            <a:r>
+              <a:rPr lang="en-US" dirty="0"/>
+              <a:t>Airbnb</a:t>
+            </a:r>
+          </a:p>
+          <a:p>
+            <a:pPr lvl="1"/>
             <a:r>
               <a:rPr lang="en-US" b="1" i="0" dirty="0">
                 <a:solidFill>
@@ -10906,9 +10918,7 @@
             </a:r>
           </a:p>
           <a:p>
-            <a:endParaRPr lang="en-US" b="1" dirty="0"/>
-          </a:p>
-          <a:p>
+            <a:pPr lvl="1"/>
             <a:r>
               <a:rPr lang="en-US" b="1" dirty="0"/>
               <a:t>Source:</a:t>
@@ -10927,87 +10937,14 @@
             </a:r>
             <a:endParaRPr lang="en-US" dirty="0"/>
           </a:p>
-        </p:txBody>
-      </p:sp>
-    </p:spTree>
-    <p:extLst>
-      <p:ext uri="{BB962C8B-B14F-4D97-AF65-F5344CB8AC3E}">
-        <p14:creationId xmlns:p14="http://schemas.microsoft.com/office/powerpoint/2010/main" val="3777850173"/>
-      </p:ext>
-    </p:extLst>
-  </p:cSld>
-  <p:clrMapOvr>
-    <a:masterClrMapping/>
-  </p:clrMapOvr>
-</p:sld>
-</file>
-
-<file path=ppt/slides/slide2.xml><?xml version="1.0" encoding="utf-8"?>
-<p:sld xmlns:a="http://schemas.openxmlformats.org/drawingml/2006/main" xmlns:r="http://schemas.openxmlformats.org/officeDocument/2006/relationships" xmlns:p="http://schemas.openxmlformats.org/presentationml/2006/main">
-  <p:cSld>
-    <p:spTree>
-      <p:nvGrpSpPr>
-        <p:cNvPr id="1" name=""/>
-        <p:cNvGrpSpPr/>
-        <p:nvPr/>
-      </p:nvGrpSpPr>
-      <p:grpSpPr>
-        <a:xfrm>
-          <a:off x="0" y="0"/>
-          <a:ext cx="0" cy="0"/>
-          <a:chOff x="0" y="0"/>
-          <a:chExt cx="0" cy="0"/>
-        </a:xfrm>
-      </p:grpSpPr>
-      <p:sp>
-        <p:nvSpPr>
-          <p:cNvPr id="2" name="Title 1">
-            <a:extLst>
-              <a:ext uri="{FF2B5EF4-FFF2-40B4-BE49-F238E27FC236}">
-                <a16:creationId xmlns:a16="http://schemas.microsoft.com/office/drawing/2014/main" id="{A4EC0B9E-BFE0-48D8-B5A2-1B71C8319C92}"/>
-              </a:ext>
-            </a:extLst>
-          </p:cNvPr>
-          <p:cNvSpPr>
-            <a:spLocks noGrp="1"/>
-          </p:cNvSpPr>
-          <p:nvPr>
-            <p:ph type="title"/>
-          </p:nvPr>
-        </p:nvSpPr>
-        <p:spPr/>
-        <p:txBody>
-          <a:bodyPr/>
-          <a:lstStyle/>
           <a:p>
             <a:r>
               <a:rPr lang="en-US" dirty="0"/>
-              <a:t>Zillow Data</a:t>
+              <a:t>Zillow</a:t>
             </a:r>
           </a:p>
-        </p:txBody>
-      </p:sp>
-      <p:sp>
-        <p:nvSpPr>
-          <p:cNvPr id="3" name="Content Placeholder 2">
-            <a:extLst>
-              <a:ext uri="{FF2B5EF4-FFF2-40B4-BE49-F238E27FC236}">
-                <a16:creationId xmlns:a16="http://schemas.microsoft.com/office/drawing/2014/main" id="{854682A1-CCB3-4D78-BF27-C625AE50EBB2}"/>
-              </a:ext>
-            </a:extLst>
-          </p:cNvPr>
-          <p:cNvSpPr>
-            <a:spLocks noGrp="1"/>
-          </p:cNvSpPr>
-          <p:nvPr>
-            <p:ph idx="1"/>
-          </p:nvPr>
-        </p:nvSpPr>
-        <p:spPr/>
-        <p:txBody>
-          <a:bodyPr/>
-          <a:lstStyle/>
-          <a:p>
+          <a:p>
+            <a:pPr lvl="1"/>
             <a:r>
               <a:rPr lang="en-US" b="1" i="0" dirty="0">
                 <a:solidFill>
@@ -11060,9 +10997,7 @@
             </a:r>
           </a:p>
           <a:p>
-            <a:endParaRPr lang="en-US" b="1" dirty="0"/>
-          </a:p>
-          <a:p>
+            <a:pPr lvl="1"/>
             <a:r>
               <a:rPr lang="en-US" b="1" dirty="0"/>
               <a:t>Source:</a:t>
@@ -11081,12 +11016,40 @@
             </a:r>
             <a:endParaRPr lang="en-US" dirty="0"/>
           </a:p>
+          <a:p>
+            <a:pPr lvl="1"/>
+            <a:endParaRPr lang="en-US" dirty="0"/>
+          </a:p>
+          <a:p>
+            <a:r>
+              <a:rPr lang="en-US" dirty="0" err="1"/>
+              <a:t>FinalProjectDatabase</a:t>
+            </a:r>
+            <a:endParaRPr lang="en-US" dirty="0"/>
+          </a:p>
+          <a:p>
+            <a:pPr lvl="1"/>
+            <a:r>
+              <a:rPr lang="en-US" dirty="0"/>
+              <a:t>Created database in Pandas and loaded tables from Pandas to SQLite</a:t>
+            </a:r>
+          </a:p>
+          <a:p>
+            <a:pPr lvl="1"/>
+            <a:r>
+              <a:rPr lang="en-US" dirty="0"/>
+              <a:t>Queried tables from SQLite for machine learning model and webapp</a:t>
+            </a:r>
+          </a:p>
+          <a:p>
+            <a:endParaRPr lang="en-US" dirty="0"/>
+          </a:p>
         </p:txBody>
       </p:sp>
     </p:spTree>
     <p:extLst>
       <p:ext uri="{BB962C8B-B14F-4D97-AF65-F5344CB8AC3E}">
-        <p14:creationId xmlns:p14="http://schemas.microsoft.com/office/powerpoint/2010/main" val="1074995092"/>
+        <p14:creationId xmlns:p14="http://schemas.microsoft.com/office/powerpoint/2010/main" val="1852654038"/>
       </p:ext>
     </p:extLst>
   </p:cSld>
@@ -11096,108 +11059,7 @@
 </p:sld>
 </file>
 
-<file path=ppt/slides/slide3.xml><?xml version="1.0" encoding="utf-8"?>
-<p:sld xmlns:a="http://schemas.openxmlformats.org/drawingml/2006/main" xmlns:r="http://schemas.openxmlformats.org/officeDocument/2006/relationships" xmlns:p="http://schemas.openxmlformats.org/presentationml/2006/main">
-  <p:cSld>
-    <p:spTree>
-      <p:nvGrpSpPr>
-        <p:cNvPr id="1" name=""/>
-        <p:cNvGrpSpPr/>
-        <p:nvPr/>
-      </p:nvGrpSpPr>
-      <p:grpSpPr>
-        <a:xfrm>
-          <a:off x="0" y="0"/>
-          <a:ext cx="0" cy="0"/>
-          <a:chOff x="0" y="0"/>
-          <a:chExt cx="0" cy="0"/>
-        </a:xfrm>
-      </p:grpSpPr>
-      <p:sp>
-        <p:nvSpPr>
-          <p:cNvPr id="2" name="Title 1">
-            <a:extLst>
-              <a:ext uri="{FF2B5EF4-FFF2-40B4-BE49-F238E27FC236}">
-                <a16:creationId xmlns:a16="http://schemas.microsoft.com/office/drawing/2014/main" id="{3487D321-CB75-4B5A-8060-75360597EC04}"/>
-              </a:ext>
-            </a:extLst>
-          </p:cNvPr>
-          <p:cNvSpPr>
-            <a:spLocks noGrp="1"/>
-          </p:cNvSpPr>
-          <p:nvPr>
-            <p:ph type="title"/>
-          </p:nvPr>
-        </p:nvSpPr>
-        <p:spPr/>
-        <p:txBody>
-          <a:bodyPr/>
-          <a:lstStyle/>
-          <a:p>
-            <a:r>
-              <a:rPr lang="en-US" dirty="0"/>
-              <a:t>Database</a:t>
-            </a:r>
-          </a:p>
-        </p:txBody>
-      </p:sp>
-      <p:sp>
-        <p:nvSpPr>
-          <p:cNvPr id="3" name="Content Placeholder 2">
-            <a:extLst>
-              <a:ext uri="{FF2B5EF4-FFF2-40B4-BE49-F238E27FC236}">
-                <a16:creationId xmlns:a16="http://schemas.microsoft.com/office/drawing/2014/main" id="{DB3FB10F-BB8F-4E8A-8E4D-4DBECD449D10}"/>
-              </a:ext>
-            </a:extLst>
-          </p:cNvPr>
-          <p:cNvSpPr>
-            <a:spLocks noGrp="1"/>
-          </p:cNvSpPr>
-          <p:nvPr>
-            <p:ph idx="1"/>
-          </p:nvPr>
-        </p:nvSpPr>
-        <p:spPr/>
-        <p:txBody>
-          <a:bodyPr/>
-          <a:lstStyle/>
-          <a:p>
-            <a:r>
-              <a:rPr lang="en-US" dirty="0"/>
-              <a:t>SQLite</a:t>
-            </a:r>
-          </a:p>
-          <a:p>
-            <a:r>
-              <a:rPr lang="en-US" dirty="0"/>
-              <a:t>Created database in Pandas and loaded tables from Pandas to SQLite</a:t>
-            </a:r>
-          </a:p>
-          <a:p>
-            <a:r>
-              <a:rPr lang="en-US" dirty="0"/>
-              <a:t>Queried tables from SQLite for machine learning model and webapp</a:t>
-            </a:r>
-          </a:p>
-          <a:p>
-            <a:endParaRPr lang="en-US" dirty="0"/>
-          </a:p>
-        </p:txBody>
-      </p:sp>
-    </p:spTree>
-    <p:extLst>
-      <p:ext uri="{BB962C8B-B14F-4D97-AF65-F5344CB8AC3E}">
-        <p14:creationId xmlns:p14="http://schemas.microsoft.com/office/powerpoint/2010/main" val="2950924254"/>
-      </p:ext>
-    </p:extLst>
-  </p:cSld>
-  <p:clrMapOvr>
-    <a:masterClrMapping/>
-  </p:clrMapOvr>
-</p:sld>
-</file>
-
-<file path=ppt/slides/slide4.xml><?xml version="1.0" encoding="utf-8"?>
+<file path=ppt/slides/slide2.xml><?xml version="1.0" encoding="utf-8"?>
 <p:sld xmlns:a="http://schemas.openxmlformats.org/drawingml/2006/main" xmlns:r="http://schemas.openxmlformats.org/officeDocument/2006/relationships" xmlns:p="http://schemas.openxmlformats.org/presentationml/2006/main">
   <p:cSld>
     <p:spTree>
@@ -11285,7 +11147,7 @@
 </p:sld>
 </file>
 
-<file path=ppt/slides/slide5.xml><?xml version="1.0" encoding="utf-8"?>
+<file path=ppt/slides/slide3.xml><?xml version="1.0" encoding="utf-8"?>
 <p:sld xmlns:a="http://schemas.openxmlformats.org/drawingml/2006/main" xmlns:r="http://schemas.openxmlformats.org/officeDocument/2006/relationships" xmlns:p="http://schemas.openxmlformats.org/presentationml/2006/main">
   <p:cSld>
     <p:spTree>
@@ -11409,7 +11271,7 @@
 </p:sld>
 </file>
 
-<file path=ppt/slides/slide6.xml><?xml version="1.0" encoding="utf-8"?>
+<file path=ppt/slides/slide4.xml><?xml version="1.0" encoding="utf-8"?>
 <p:sld xmlns:a="http://schemas.openxmlformats.org/drawingml/2006/main" xmlns:r="http://schemas.openxmlformats.org/officeDocument/2006/relationships" xmlns:p="http://schemas.openxmlformats.org/presentationml/2006/main">
   <p:cSld>
     <p:spTree>
@@ -11498,7 +11360,7 @@
 </p:sld>
 </file>
 
-<file path=ppt/slides/slide7.xml><?xml version="1.0" encoding="utf-8"?>
+<file path=ppt/slides/slide5.xml><?xml version="1.0" encoding="utf-8"?>
 <p:sld xmlns:a="http://schemas.openxmlformats.org/drawingml/2006/main" xmlns:r="http://schemas.openxmlformats.org/officeDocument/2006/relationships" xmlns:p="http://schemas.openxmlformats.org/presentationml/2006/main">
   <p:cSld>
     <p:spTree>

</xml_diff>